<commit_message>
Yazılım Mühendisliği dersi için geliştirilmiş proje
</commit_message>
<xml_diff>
--- a/Documents/Sunum Dosyası.pptx
+++ b/Documents/Sunum Dosyası.pptx
@@ -109,6 +109,11 @@
       </a:defRPr>
     </a:lvl9pPr>
   </p:defaultTextStyle>
+  <p:extLst>
+    <p:ext uri="{EFAFB233-063F-42B5-8137-9DF3F51BA10A}">
+      <p15:sldGuideLst xmlns:p15="http://schemas.microsoft.com/office/powerpoint/2012/main"/>
+    </p:ext>
+  </p:extLst>
 </p:presentation>
 </file>
 
@@ -300,7 +305,7 @@
           <a:p>
             <a:fld id="{27789507-93D9-47B4-806E-4AD358648BD8}" type="datetimeFigureOut">
               <a:rPr lang="tr-TR" smtClean="0"/>
-              <a:t>10.01.2023</a:t>
+              <a:t>15.01.2023</a:t>
             </a:fld>
             <a:endParaRPr lang="tr-TR"/>
           </a:p>
@@ -638,7 +643,7 @@
           <a:p>
             <a:fld id="{27789507-93D9-47B4-806E-4AD358648BD8}" type="datetimeFigureOut">
               <a:rPr lang="tr-TR" smtClean="0"/>
-              <a:t>10.01.2023</a:t>
+              <a:t>15.01.2023</a:t>
             </a:fld>
             <a:endParaRPr lang="tr-TR"/>
           </a:p>
@@ -1039,7 +1044,7 @@
           <a:p>
             <a:fld id="{27789507-93D9-47B4-806E-4AD358648BD8}" type="datetimeFigureOut">
               <a:rPr lang="tr-TR" smtClean="0"/>
-              <a:t>10.01.2023</a:t>
+              <a:t>15.01.2023</a:t>
             </a:fld>
             <a:endParaRPr lang="tr-TR"/>
           </a:p>
@@ -1375,7 +1380,7 @@
           <a:p>
             <a:fld id="{27789507-93D9-47B4-806E-4AD358648BD8}" type="datetimeFigureOut">
               <a:rPr lang="tr-TR" smtClean="0"/>
-              <a:t>10.01.2023</a:t>
+              <a:t>15.01.2023</a:t>
             </a:fld>
             <a:endParaRPr lang="tr-TR"/>
           </a:p>
@@ -1695,7 +1700,7 @@
           <a:p>
             <a:fld id="{27789507-93D9-47B4-806E-4AD358648BD8}" type="datetimeFigureOut">
               <a:rPr lang="tr-TR" smtClean="0"/>
-              <a:t>10.01.2023</a:t>
+              <a:t>15.01.2023</a:t>
             </a:fld>
             <a:endParaRPr lang="tr-TR"/>
           </a:p>
@@ -2091,7 +2096,7 @@
           <a:p>
             <a:fld id="{27789507-93D9-47B4-806E-4AD358648BD8}" type="datetimeFigureOut">
               <a:rPr lang="tr-TR" smtClean="0"/>
-              <a:t>10.01.2023</a:t>
+              <a:t>15.01.2023</a:t>
             </a:fld>
             <a:endParaRPr lang="tr-TR"/>
           </a:p>
@@ -2348,7 +2353,7 @@
           <a:p>
             <a:fld id="{27789507-93D9-47B4-806E-4AD358648BD8}" type="datetimeFigureOut">
               <a:rPr lang="tr-TR" smtClean="0"/>
-              <a:t>10.01.2023</a:t>
+              <a:t>15.01.2023</a:t>
             </a:fld>
             <a:endParaRPr lang="tr-TR"/>
           </a:p>
@@ -2610,7 +2615,7 @@
           <a:p>
             <a:fld id="{27789507-93D9-47B4-806E-4AD358648BD8}" type="datetimeFigureOut">
               <a:rPr lang="tr-TR" smtClean="0"/>
-              <a:t>10.01.2023</a:t>
+              <a:t>15.01.2023</a:t>
             </a:fld>
             <a:endParaRPr lang="tr-TR"/>
           </a:p>
@@ -2872,7 +2877,7 @@
           <a:p>
             <a:fld id="{27789507-93D9-47B4-806E-4AD358648BD8}" type="datetimeFigureOut">
               <a:rPr lang="tr-TR" smtClean="0"/>
-              <a:t>10.01.2023</a:t>
+              <a:t>15.01.2023</a:t>
             </a:fld>
             <a:endParaRPr lang="tr-TR"/>
           </a:p>
@@ -3201,7 +3206,7 @@
           <a:p>
             <a:fld id="{27789507-93D9-47B4-806E-4AD358648BD8}" type="datetimeFigureOut">
               <a:rPr lang="tr-TR" smtClean="0"/>
-              <a:t>10.01.2023</a:t>
+              <a:t>15.01.2023</a:t>
             </a:fld>
             <a:endParaRPr lang="tr-TR"/>
           </a:p>
@@ -3524,7 +3529,7 @@
           <a:p>
             <a:fld id="{27789507-93D9-47B4-806E-4AD358648BD8}" type="datetimeFigureOut">
               <a:rPr lang="tr-TR" smtClean="0"/>
-              <a:t>10.01.2023</a:t>
+              <a:t>15.01.2023</a:t>
             </a:fld>
             <a:endParaRPr lang="tr-TR"/>
           </a:p>
@@ -3981,7 +3986,7 @@
           <a:p>
             <a:fld id="{27789507-93D9-47B4-806E-4AD358648BD8}" type="datetimeFigureOut">
               <a:rPr lang="tr-TR" smtClean="0"/>
-              <a:t>10.01.2023</a:t>
+              <a:t>15.01.2023</a:t>
             </a:fld>
             <a:endParaRPr lang="tr-TR"/>
           </a:p>
@@ -4186,7 +4191,7 @@
           <a:p>
             <a:fld id="{27789507-93D9-47B4-806E-4AD358648BD8}" type="datetimeFigureOut">
               <a:rPr lang="tr-TR" smtClean="0"/>
-              <a:t>10.01.2023</a:t>
+              <a:t>15.01.2023</a:t>
             </a:fld>
             <a:endParaRPr lang="tr-TR"/>
           </a:p>
@@ -4363,7 +4368,7 @@
           <a:p>
             <a:fld id="{27789507-93D9-47B4-806E-4AD358648BD8}" type="datetimeFigureOut">
               <a:rPr lang="tr-TR" smtClean="0"/>
-              <a:t>10.01.2023</a:t>
+              <a:t>15.01.2023</a:t>
             </a:fld>
             <a:endParaRPr lang="tr-TR"/>
           </a:p>
@@ -4696,7 +4701,7 @@
           <a:p>
             <a:fld id="{27789507-93D9-47B4-806E-4AD358648BD8}" type="datetimeFigureOut">
               <a:rPr lang="tr-TR" smtClean="0"/>
-              <a:t>10.01.2023</a:t>
+              <a:t>15.01.2023</a:t>
             </a:fld>
             <a:endParaRPr lang="tr-TR"/>
           </a:p>
@@ -5041,7 +5046,7 @@
           <a:p>
             <a:fld id="{27789507-93D9-47B4-806E-4AD358648BD8}" type="datetimeFigureOut">
               <a:rPr lang="tr-TR" smtClean="0"/>
-              <a:t>10.01.2023</a:t>
+              <a:t>15.01.2023</a:t>
             </a:fld>
             <a:endParaRPr lang="tr-TR"/>
           </a:p>
@@ -7158,7 +7163,7 @@
           <a:p>
             <a:fld id="{27789507-93D9-47B4-806E-4AD358648BD8}" type="datetimeFigureOut">
               <a:rPr lang="tr-TR" smtClean="0"/>
-              <a:t>10.01.2023</a:t>
+              <a:t>15.01.2023</a:t>
             </a:fld>
             <a:endParaRPr lang="tr-TR"/>
           </a:p>
@@ -7722,24 +7727,6 @@
             </a:r>
           </a:p>
           <a:p>
-            <a:r>
-              <a:rPr lang="tr-TR" dirty="0" smtClean="0"/>
-              <a:t>Danışman</a:t>
-            </a:r>
-            <a:r>
-              <a:rPr lang="tr-TR" dirty="0"/>
-              <a:t>: Dr. </a:t>
-            </a:r>
-            <a:r>
-              <a:rPr lang="tr-TR" dirty="0" err="1"/>
-              <a:t>Öğr</a:t>
-            </a:r>
-            <a:r>
-              <a:rPr lang="tr-TR" dirty="0"/>
-              <a:t>. Üyesi Muhammed Fatih ALAEDDİNOĞLU</a:t>
-            </a:r>
-          </a:p>
-          <a:p>
             <a:endParaRPr lang="tr-TR" dirty="0"/>
           </a:p>
         </p:txBody>

</xml_diff>